<commit_message>
add ts guidelines 8
</commit_message>
<xml_diff>
--- a/docs/plume2-starter项目实战.pptx
+++ b/docs/plume2-starter项目实战.pptx
@@ -11445,7 +11445,7 @@
             </a:r>
             <a:r>
               <a:rPr kumimoji="1" lang="zh-CN" altLang="en-US" dirty="0" smtClean="0"/>
-              <a:t>的</a:t>
+              <a:t> </a:t>
             </a:r>
             <a:r>
               <a:rPr kumimoji="1" lang="en-US" altLang="zh-CN" dirty="0" smtClean="0"/>
@@ -11453,37 +11453,108 @@
             </a:r>
             <a:r>
               <a:rPr kumimoji="1" lang="zh-CN" altLang="en-US" dirty="0" smtClean="0"/>
-              <a:t>编码规范 </a:t>
+              <a:t> 编码规范</a:t>
             </a:r>
           </a:p>
           <a:p>
             <a:pPr lvl="1"/>
             <a:r>
-              <a:rPr kumimoji="1" lang="en-US" altLang="zh-CN" dirty="0">
-                <a:hlinkClick r:id="rId2"/>
-              </a:rPr>
+              <a:rPr kumimoji="1" lang="en-US" altLang="zh-CN" dirty="0"/>
               <a:t>http://</a:t>
             </a:r>
             <a:r>
-              <a:rPr kumimoji="1" lang="en-US" altLang="zh-CN" dirty="0" smtClean="0">
-                <a:hlinkClick r:id="rId2"/>
-              </a:rPr>
-              <a:t>www.kancloud.cn/kancloud/javascript-style-guide/43119</a:t>
+              <a:rPr kumimoji="1" lang="en-US" altLang="zh-CN" dirty="0" err="1"/>
+              <a:t>www.kancloud.cn</a:t>
+            </a:r>
+            <a:r>
+              <a:rPr kumimoji="1" lang="en-US" altLang="zh-CN" dirty="0"/>
+              <a:t>/</a:t>
+            </a:r>
+            <a:r>
+              <a:rPr kumimoji="1" lang="en-US" altLang="zh-CN" dirty="0" err="1"/>
+              <a:t>kancloud</a:t>
+            </a:r>
+            <a:r>
+              <a:rPr kumimoji="1" lang="en-US" altLang="zh-CN" dirty="0"/>
+              <a:t>/</a:t>
+            </a:r>
+            <a:r>
+              <a:rPr kumimoji="1" lang="en-US" altLang="zh-CN" dirty="0" err="1"/>
+              <a:t>javascript</a:t>
+            </a:r>
+            <a:r>
+              <a:rPr kumimoji="1" lang="en-US" altLang="zh-CN" dirty="0"/>
+              <a:t>-style-guide/43119</a:t>
             </a:r>
             <a:endParaRPr kumimoji="1" lang="zh-CN" altLang="en-US" dirty="0" smtClean="0"/>
           </a:p>
           <a:p>
             <a:r>
+              <a:rPr kumimoji="1" lang="en-US" altLang="zh-CN" dirty="0" err="1" smtClean="0"/>
+              <a:t>Jsdoc</a:t>
+            </a:r>
+            <a:r>
+              <a:rPr kumimoji="1" lang="zh-CN" altLang="en-US" dirty="0" smtClean="0"/>
+              <a:t> 注释风格</a:t>
+            </a:r>
+          </a:p>
+          <a:p>
+            <a:pPr lvl="1"/>
+            <a:r>
+              <a:rPr kumimoji="1" lang="en-US" altLang="zh-CN" dirty="0"/>
+              <a:t>http://www.css88.com/doc/</a:t>
+            </a:r>
+            <a:r>
+              <a:rPr kumimoji="1" lang="en-US" altLang="zh-CN" dirty="0" err="1"/>
+              <a:t>jsdoc</a:t>
+            </a:r>
+            <a:r>
+              <a:rPr kumimoji="1" lang="en-US" altLang="zh-CN" dirty="0"/>
+              <a:t>/</a:t>
+            </a:r>
+            <a:r>
+              <a:rPr kumimoji="1" lang="en-US" altLang="zh-CN" dirty="0" err="1"/>
+              <a:t>index.html</a:t>
+            </a:r>
+            <a:endParaRPr kumimoji="1" lang="zh-CN" altLang="en-US" dirty="0" smtClean="0"/>
+          </a:p>
+          <a:p>
+            <a:r>
               <a:rPr kumimoji="1" lang="en-US" altLang="zh-CN" dirty="0" smtClean="0"/>
-              <a:t>Plume2</a:t>
-            </a:r>
-            <a:r>
-              <a:rPr kumimoji="1" lang="zh-CN" altLang="en-US" smtClean="0"/>
-              <a:t>的编码规范</a:t>
-            </a:r>
-          </a:p>
-          <a:p>
-            <a:endParaRPr kumimoji="1" lang="zh-CN" altLang="en-US" smtClean="0"/>
+              <a:t>plume2</a:t>
+            </a:r>
+            <a:r>
+              <a:rPr kumimoji="1" lang="zh-CN" altLang="en-US" dirty="0" smtClean="0"/>
+              <a:t>项目规范</a:t>
+            </a:r>
+          </a:p>
+          <a:p>
+            <a:pPr lvl="1"/>
+            <a:r>
+              <a:rPr kumimoji="1" lang="en-US" altLang="zh-CN" dirty="0"/>
+              <a:t>https://</a:t>
+            </a:r>
+            <a:r>
+              <a:rPr kumimoji="1" lang="en-US" altLang="zh-CN" dirty="0" err="1"/>
+              <a:t>github.com</a:t>
+            </a:r>
+            <a:r>
+              <a:rPr kumimoji="1" lang="en-US" altLang="zh-CN" dirty="0"/>
+              <a:t>/</a:t>
+            </a:r>
+            <a:r>
+              <a:rPr kumimoji="1" lang="en-US" altLang="zh-CN" dirty="0" err="1"/>
+              <a:t>hufeng</a:t>
+            </a:r>
+            <a:r>
+              <a:rPr kumimoji="1" lang="en-US" altLang="zh-CN" dirty="0"/>
+              <a:t>/plume2-starter/blob/master/docs/typescript-</a:t>
+            </a:r>
+            <a:r>
+              <a:rPr kumimoji="1" lang="en-US" altLang="zh-CN" dirty="0" err="1"/>
+              <a:t>guidelines.md</a:t>
+            </a:r>
+            <a:endParaRPr kumimoji="1" lang="zh-CN" altLang="en-US" dirty="0"/>
           </a:p>
         </p:txBody>
       </p:sp>

</xml_diff>